<commit_message>
📝 docs: Update README with new banner image and badge layout
- Replaced local banner image with a new GitHub-hosted image.
- Repositioned NuGet Downloads, GitHub License, and NuGet Version badges below the banner image.
- Removed the <div align="center"> block for improved layout.
</commit_message>
<xml_diff>
--- a/docs/template/images/banner.pptx
+++ b/docs/template/images/banner.pptx
@@ -243,7 +243,7 @@
           <a:p>
             <a:fld id="{36315F81-BEF3-4F9B-AC41-522F2A5A8578}" type="datetimeFigureOut">
               <a:rPr lang="en-GH" smtClean="0"/>
-              <a:t>20/08/2024</a:t>
+              <a:t>06/09/2024</a:t>
             </a:fld>
             <a:endParaRPr lang="en-GH" dirty="0"/>
           </a:p>
@@ -413,7 +413,7 @@
           <a:p>
             <a:fld id="{36315F81-BEF3-4F9B-AC41-522F2A5A8578}" type="datetimeFigureOut">
               <a:rPr lang="en-GH" smtClean="0"/>
-              <a:t>20/08/2024</a:t>
+              <a:t>06/09/2024</a:t>
             </a:fld>
             <a:endParaRPr lang="en-GH" dirty="0"/>
           </a:p>
@@ -593,7 +593,7 @@
           <a:p>
             <a:fld id="{36315F81-BEF3-4F9B-AC41-522F2A5A8578}" type="datetimeFigureOut">
               <a:rPr lang="en-GH" smtClean="0"/>
-              <a:t>20/08/2024</a:t>
+              <a:t>06/09/2024</a:t>
             </a:fld>
             <a:endParaRPr lang="en-GH" dirty="0"/>
           </a:p>
@@ -763,7 +763,7 @@
           <a:p>
             <a:fld id="{36315F81-BEF3-4F9B-AC41-522F2A5A8578}" type="datetimeFigureOut">
               <a:rPr lang="en-GH" smtClean="0"/>
-              <a:t>20/08/2024</a:t>
+              <a:t>06/09/2024</a:t>
             </a:fld>
             <a:endParaRPr lang="en-GH" dirty="0"/>
           </a:p>
@@ -1009,7 +1009,7 @@
           <a:p>
             <a:fld id="{36315F81-BEF3-4F9B-AC41-522F2A5A8578}" type="datetimeFigureOut">
               <a:rPr lang="en-GH" smtClean="0"/>
-              <a:t>20/08/2024</a:t>
+              <a:t>06/09/2024</a:t>
             </a:fld>
             <a:endParaRPr lang="en-GH" dirty="0"/>
           </a:p>
@@ -1241,7 +1241,7 @@
           <a:p>
             <a:fld id="{36315F81-BEF3-4F9B-AC41-522F2A5A8578}" type="datetimeFigureOut">
               <a:rPr lang="en-GH" smtClean="0"/>
-              <a:t>20/08/2024</a:t>
+              <a:t>06/09/2024</a:t>
             </a:fld>
             <a:endParaRPr lang="en-GH" dirty="0"/>
           </a:p>
@@ -1608,7 +1608,7 @@
           <a:p>
             <a:fld id="{36315F81-BEF3-4F9B-AC41-522F2A5A8578}" type="datetimeFigureOut">
               <a:rPr lang="en-GH" smtClean="0"/>
-              <a:t>20/08/2024</a:t>
+              <a:t>06/09/2024</a:t>
             </a:fld>
             <a:endParaRPr lang="en-GH" dirty="0"/>
           </a:p>
@@ -1726,7 +1726,7 @@
           <a:p>
             <a:fld id="{36315F81-BEF3-4F9B-AC41-522F2A5A8578}" type="datetimeFigureOut">
               <a:rPr lang="en-GH" smtClean="0"/>
-              <a:t>20/08/2024</a:t>
+              <a:t>06/09/2024</a:t>
             </a:fld>
             <a:endParaRPr lang="en-GH" dirty="0"/>
           </a:p>
@@ -1821,7 +1821,7 @@
           <a:p>
             <a:fld id="{36315F81-BEF3-4F9B-AC41-522F2A5A8578}" type="datetimeFigureOut">
               <a:rPr lang="en-GH" smtClean="0"/>
-              <a:t>20/08/2024</a:t>
+              <a:t>06/09/2024</a:t>
             </a:fld>
             <a:endParaRPr lang="en-GH" dirty="0"/>
           </a:p>
@@ -2098,7 +2098,7 @@
           <a:p>
             <a:fld id="{36315F81-BEF3-4F9B-AC41-522F2A5A8578}" type="datetimeFigureOut">
               <a:rPr lang="en-GH" smtClean="0"/>
-              <a:t>20/08/2024</a:t>
+              <a:t>06/09/2024</a:t>
             </a:fld>
             <a:endParaRPr lang="en-GH" dirty="0"/>
           </a:p>
@@ -2355,7 +2355,7 @@
           <a:p>
             <a:fld id="{36315F81-BEF3-4F9B-AC41-522F2A5A8578}" type="datetimeFigureOut">
               <a:rPr lang="en-GH" smtClean="0"/>
-              <a:t>20/08/2024</a:t>
+              <a:t>06/09/2024</a:t>
             </a:fld>
             <a:endParaRPr lang="en-GH" dirty="0"/>
           </a:p>
@@ -2568,7 +2568,7 @@
           <a:p>
             <a:fld id="{36315F81-BEF3-4F9B-AC41-522F2A5A8578}" type="datetimeFigureOut">
               <a:rPr lang="en-GH" smtClean="0"/>
-              <a:t>20/08/2024</a:t>
+              <a:t>06/09/2024</a:t>
             </a:fld>
             <a:endParaRPr lang="en-GH" dirty="0"/>
           </a:p>
@@ -3549,42 +3549,6 @@
           </p:pic>
         </p:grpSp>
       </p:grpSp>
-      <p:pic>
-        <p:nvPicPr>
-          <p:cNvPr id="7" name="Picture 6" descr="A pink banner with a megaphone and black text&#10;&#10;Description automatically generated">
-            <a:extLst>
-              <a:ext uri="{FF2B5EF4-FFF2-40B4-BE49-F238E27FC236}">
-                <a16:creationId xmlns:a16="http://schemas.microsoft.com/office/drawing/2014/main" id="{4641F877-77A2-A2C3-3F8D-5CD47D1349DD}"/>
-              </a:ext>
-            </a:extLst>
-          </p:cNvPr>
-          <p:cNvPicPr>
-            <a:picLocks noChangeAspect="1"/>
-          </p:cNvPicPr>
-          <p:nvPr/>
-        </p:nvPicPr>
-        <p:blipFill>
-          <a:blip r:embed="rId8">
-            <a:extLst>
-              <a:ext uri="{28A0092B-C50C-407E-A947-70E740481C1C}">
-                <a14:useLocalDpi xmlns:a14="http://schemas.microsoft.com/office/drawing/2010/main" val="0"/>
-              </a:ext>
-            </a:extLst>
-          </a:blip>
-          <a:stretch>
-            <a:fillRect/>
-          </a:stretch>
-        </p:blipFill>
-        <p:spPr>
-          <a:xfrm>
-            <a:off x="8157415" y="7055047"/>
-            <a:ext cx="9794578" cy="6229767"/>
-          </a:xfrm>
-          <a:prstGeom prst="rect">
-            <a:avLst/>
-          </a:prstGeom>
-        </p:spPr>
-      </p:pic>
     </p:spTree>
     <p:extLst>
       <p:ext uri="{BB962C8B-B14F-4D97-AF65-F5344CB8AC3E}">

</xml_diff>